<commit_message>
Research & some more planning
Research read and added to .ppt, classes for Utility based decision making added and some comments relating to the intended implementation added.
</commit_message>
<xml_diff>
--- a/research stuff.pptx
+++ b/research stuff.pptx
@@ -2884,7 +2884,7 @@
             <a:fld id="{0A98AF03-7270-45C2-A683-C5E353EF01A5}" type="datetime4">
               <a:rPr lang="en-US" smtClean="0"/>
               <a:pPr/>
-              <a:t>January 21, 2020</a:t>
+              <a:t>January 28, 2020</a:t>
             </a:fld>
             <a:endParaRPr lang="en-US" dirty="0"/>
           </a:p>
@@ -3171,7 +3171,7 @@
             <a:fld id="{A2FB5AFD-D735-4504-A039-ADEBB6448D55}" type="datetime4">
               <a:rPr lang="en-US" smtClean="0"/>
               <a:pPr/>
-              <a:t>January 21, 2020</a:t>
+              <a:t>January 28, 2020</a:t>
             </a:fld>
             <a:endParaRPr lang="en-US"/>
           </a:p>
@@ -3348,7 +3348,7 @@
             <a:fld id="{AB5C8118-FB93-4E87-B380-0175F2FE2167}" type="datetime4">
               <a:rPr lang="en-US" smtClean="0"/>
               <a:pPr/>
-              <a:t>January 21, 2020</a:t>
+              <a:t>January 28, 2020</a:t>
             </a:fld>
             <a:endParaRPr lang="en-US"/>
           </a:p>
@@ -3515,7 +3515,7 @@
             <a:fld id="{05A93482-8E69-40F7-BCAD-5662A6CADB27}" type="datetime4">
               <a:rPr lang="en-US" smtClean="0"/>
               <a:pPr/>
-              <a:t>January 21, 2020</a:t>
+              <a:t>January 28, 2020</a:t>
             </a:fld>
             <a:endParaRPr lang="en-US"/>
           </a:p>
@@ -3758,7 +3758,7 @@
             <a:fld id="{FBB7EAE1-CAAC-4AEF-919E-158692B1E55E}" type="datetime4">
               <a:rPr lang="en-US" smtClean="0"/>
               <a:pPr/>
-              <a:t>January 21, 2020</a:t>
+              <a:t>January 28, 2020</a:t>
             </a:fld>
             <a:endParaRPr lang="en-US"/>
           </a:p>
@@ -3873,7 +3873,7 @@
             <a:fld id="{9525A706-D8F2-4D1A-855A-CADC92600C26}" type="datetime4">
               <a:rPr lang="en-US" smtClean="0"/>
               <a:pPr/>
-              <a:t>January 21, 2020</a:t>
+              <a:t>January 28, 2020</a:t>
             </a:fld>
             <a:endParaRPr lang="en-US"/>
           </a:p>
@@ -4414,7 +4414,7 @@
             <a:fld id="{99B4F123-1704-49AC-9D15-C4B1462B8014}" type="datetime4">
               <a:rPr lang="en-US" smtClean="0"/>
               <a:pPr/>
-              <a:t>January 21, 2020</a:t>
+              <a:t>January 28, 2020</a:t>
             </a:fld>
             <a:endParaRPr lang="en-US"/>
           </a:p>
@@ -4529,7 +4529,7 @@
             <a:fld id="{E3127EC2-47FB-48A1-8644-C8A81DDAA119}" type="datetime4">
               <a:rPr lang="en-US" smtClean="0"/>
               <a:pPr/>
-              <a:t>January 21, 2020</a:t>
+              <a:t>January 28, 2020</a:t>
             </a:fld>
             <a:endParaRPr lang="en-US"/>
           </a:p>
@@ -4621,7 +4621,7 @@
             <a:fld id="{AE3EC3ED-7435-49F9-84C8-03CCA2F8DEDB}" type="datetime4">
               <a:rPr lang="en-US" smtClean="0"/>
               <a:pPr/>
-              <a:t>January 21, 2020</a:t>
+              <a:t>January 28, 2020</a:t>
             </a:fld>
             <a:endParaRPr lang="en-US"/>
           </a:p>
@@ -7274,7 +7274,7 @@
             <a:fld id="{3FC49BF1-FCD3-4395-8FF6-0047AF66228E}" type="datetime4">
               <a:rPr lang="en-US" smtClean="0"/>
               <a:pPr/>
-              <a:t>January 21, 2020</a:t>
+              <a:t>January 28, 2020</a:t>
             </a:fld>
             <a:endParaRPr lang="en-US"/>
           </a:p>
@@ -10488,7 +10488,7 @@
             <a:fld id="{CA861222-2C8B-4501-BE87-6797EC025925}" type="datetime4">
               <a:rPr lang="en-US" smtClean="0"/>
               <a:pPr/>
-              <a:t>January 21, 2020</a:t>
+              <a:t>January 28, 2020</a:t>
             </a:fld>
             <a:endParaRPr lang="en-US"/>
           </a:p>
@@ -13312,7 +13312,7 @@
             <a:fld id="{16C01193-8287-4834-A286-6B880643E934}" type="datetime4">
               <a:rPr lang="en-US" smtClean="0"/>
               <a:pPr/>
-              <a:t>January 21, 2020</a:t>
+              <a:t>January 28, 2020</a:t>
             </a:fld>
             <a:endParaRPr lang="en-US"/>
           </a:p>
@@ -13963,7 +13963,7 @@
         <p:spPr/>
         <p:txBody>
           <a:bodyPr>
-            <a:normAutofit fontScale="47500" lnSpcReduction="20000"/>
+            <a:normAutofit fontScale="40000" lnSpcReduction="20000"/>
           </a:bodyPr>
           <a:lstStyle/>
           <a:p>
@@ -14088,6 +14088,32 @@
               </a:rPr>
               <a:t>/</a:t>
             </a:r>
+            <a:endParaRPr lang="en-GB" dirty="0" smtClean="0"/>
+          </a:p>
+          <a:p>
+            <a:pPr lvl="1"/>
+            <a:r>
+              <a:rPr lang="en-GB" dirty="0">
+                <a:hlinkClick r:id="rId8"/>
+              </a:rPr>
+              <a:t>https://alastaira.wordpress.com/2013/01/25/at-a-glance-functions-for-modelling-utility-based-game-ai</a:t>
+            </a:r>
+            <a:r>
+              <a:rPr lang="en-GB" dirty="0" smtClean="0">
+                <a:hlinkClick r:id="rId8"/>
+              </a:rPr>
+              <a:t>/</a:t>
+            </a:r>
+            <a:endParaRPr lang="en-GB" dirty="0" smtClean="0"/>
+          </a:p>
+          <a:p>
+            <a:pPr lvl="1"/>
+            <a:r>
+              <a:rPr lang="en-GB">
+                <a:hlinkClick r:id="rId9"/>
+              </a:rPr>
+              <a:t>https://mcguirev10.com/2019/01/03/ai-decision-making-with-utility-scores-part-1.html</a:t>
+            </a:r>
             <a:endParaRPr lang="en-GB" dirty="0"/>
           </a:p>
           <a:p>
@@ -14100,13 +14126,13 @@
             <a:pPr lvl="1"/>
             <a:r>
               <a:rPr lang="en-GB" dirty="0">
-                <a:hlinkClick r:id="rId8"/>
+                <a:hlinkClick r:id="rId10"/>
               </a:rPr>
               <a:t>https://guttulus.com/what-is-local-search-algorithm-in-artificial-intelligence</a:t>
             </a:r>
             <a:r>
               <a:rPr lang="en-GB" dirty="0" smtClean="0">
-                <a:hlinkClick r:id="rId8"/>
+                <a:hlinkClick r:id="rId10"/>
               </a:rPr>
               <a:t>/</a:t>
             </a:r>
@@ -14122,13 +14148,13 @@
             <a:pPr lvl="1"/>
             <a:r>
               <a:rPr lang="en-GB" dirty="0">
-                <a:hlinkClick r:id="rId9"/>
+                <a:hlinkClick r:id="rId11"/>
               </a:rPr>
               <a:t>https://</a:t>
             </a:r>
             <a:r>
               <a:rPr lang="en-GB" dirty="0" smtClean="0">
-                <a:hlinkClick r:id="rId9"/>
+                <a:hlinkClick r:id="rId11"/>
               </a:rPr>
               <a:t>en.wikipedia.org/wiki/Monte_Carlo_tree_search</a:t>
             </a:r>
@@ -14138,13 +14164,13 @@
             <a:pPr lvl="1"/>
             <a:r>
               <a:rPr lang="en-GB" dirty="0">
-                <a:hlinkClick r:id="rId10"/>
+                <a:hlinkClick r:id="rId12"/>
               </a:rPr>
               <a:t>https://www.analyticsvidhya.com/blog/2019/01/monte-carlo-tree-search-introduction-algorithm-deepmind-alphago</a:t>
             </a:r>
             <a:r>
               <a:rPr lang="en-GB" dirty="0" smtClean="0">
-                <a:hlinkClick r:id="rId10"/>
+                <a:hlinkClick r:id="rId12"/>
               </a:rPr>
               <a:t>/</a:t>
             </a:r>

</xml_diff>

<commit_message>
Added A* pathfinding research link for a unity based implementation.
</commit_message>
<xml_diff>
--- a/research stuff.pptx
+++ b/research stuff.pptx
@@ -2884,7 +2884,7 @@
             <a:fld id="{0A98AF03-7270-45C2-A683-C5E353EF01A5}" type="datetime4">
               <a:rPr lang="en-US" smtClean="0"/>
               <a:pPr/>
-              <a:t>January 28, 2020</a:t>
+              <a:t>February 10, 2020</a:t>
             </a:fld>
             <a:endParaRPr lang="en-US" dirty="0"/>
           </a:p>
@@ -3171,7 +3171,7 @@
             <a:fld id="{A2FB5AFD-D735-4504-A039-ADEBB6448D55}" type="datetime4">
               <a:rPr lang="en-US" smtClean="0"/>
               <a:pPr/>
-              <a:t>January 28, 2020</a:t>
+              <a:t>February 10, 2020</a:t>
             </a:fld>
             <a:endParaRPr lang="en-US"/>
           </a:p>
@@ -3348,7 +3348,7 @@
             <a:fld id="{AB5C8118-FB93-4E87-B380-0175F2FE2167}" type="datetime4">
               <a:rPr lang="en-US" smtClean="0"/>
               <a:pPr/>
-              <a:t>January 28, 2020</a:t>
+              <a:t>February 10, 2020</a:t>
             </a:fld>
             <a:endParaRPr lang="en-US"/>
           </a:p>
@@ -3515,7 +3515,7 @@
             <a:fld id="{05A93482-8E69-40F7-BCAD-5662A6CADB27}" type="datetime4">
               <a:rPr lang="en-US" smtClean="0"/>
               <a:pPr/>
-              <a:t>January 28, 2020</a:t>
+              <a:t>February 10, 2020</a:t>
             </a:fld>
             <a:endParaRPr lang="en-US"/>
           </a:p>
@@ -3758,7 +3758,7 @@
             <a:fld id="{FBB7EAE1-CAAC-4AEF-919E-158692B1E55E}" type="datetime4">
               <a:rPr lang="en-US" smtClean="0"/>
               <a:pPr/>
-              <a:t>January 28, 2020</a:t>
+              <a:t>February 10, 2020</a:t>
             </a:fld>
             <a:endParaRPr lang="en-US"/>
           </a:p>
@@ -3873,7 +3873,7 @@
             <a:fld id="{9525A706-D8F2-4D1A-855A-CADC92600C26}" type="datetime4">
               <a:rPr lang="en-US" smtClean="0"/>
               <a:pPr/>
-              <a:t>January 28, 2020</a:t>
+              <a:t>February 10, 2020</a:t>
             </a:fld>
             <a:endParaRPr lang="en-US"/>
           </a:p>
@@ -4414,7 +4414,7 @@
             <a:fld id="{99B4F123-1704-49AC-9D15-C4B1462B8014}" type="datetime4">
               <a:rPr lang="en-US" smtClean="0"/>
               <a:pPr/>
-              <a:t>January 28, 2020</a:t>
+              <a:t>February 10, 2020</a:t>
             </a:fld>
             <a:endParaRPr lang="en-US"/>
           </a:p>
@@ -4529,7 +4529,7 @@
             <a:fld id="{E3127EC2-47FB-48A1-8644-C8A81DDAA119}" type="datetime4">
               <a:rPr lang="en-US" smtClean="0"/>
               <a:pPr/>
-              <a:t>January 28, 2020</a:t>
+              <a:t>February 10, 2020</a:t>
             </a:fld>
             <a:endParaRPr lang="en-US"/>
           </a:p>
@@ -4621,7 +4621,7 @@
             <a:fld id="{AE3EC3ED-7435-49F9-84C8-03CCA2F8DEDB}" type="datetime4">
               <a:rPr lang="en-US" smtClean="0"/>
               <a:pPr/>
-              <a:t>January 28, 2020</a:t>
+              <a:t>February 10, 2020</a:t>
             </a:fld>
             <a:endParaRPr lang="en-US"/>
           </a:p>
@@ -7274,7 +7274,7 @@
             <a:fld id="{3FC49BF1-FCD3-4395-8FF6-0047AF66228E}" type="datetime4">
               <a:rPr lang="en-US" smtClean="0"/>
               <a:pPr/>
-              <a:t>January 28, 2020</a:t>
+              <a:t>February 10, 2020</a:t>
             </a:fld>
             <a:endParaRPr lang="en-US"/>
           </a:p>
@@ -10488,7 +10488,7 @@
             <a:fld id="{CA861222-2C8B-4501-BE87-6797EC025925}" type="datetime4">
               <a:rPr lang="en-US" smtClean="0"/>
               <a:pPr/>
-              <a:t>January 28, 2020</a:t>
+              <a:t>February 10, 2020</a:t>
             </a:fld>
             <a:endParaRPr lang="en-US"/>
           </a:p>
@@ -13312,7 +13312,7 @@
             <a:fld id="{16C01193-8287-4834-A286-6B880643E934}" type="datetime4">
               <a:rPr lang="en-US" smtClean="0"/>
               <a:pPr/>
-              <a:t>January 28, 2020</a:t>
+              <a:t>February 10, 2020</a:t>
             </a:fld>
             <a:endParaRPr lang="en-US"/>
           </a:p>
@@ -14009,6 +14009,28 @@
             <a:endParaRPr lang="en-GB" dirty="0" smtClean="0"/>
           </a:p>
           <a:p>
+            <a:pPr lvl="1"/>
+            <a:r>
+              <a:rPr lang="en-GB">
+                <a:hlinkClick r:id="rId4"/>
+              </a:rPr>
+              <a:t>https://</a:t>
+            </a:r>
+            <a:r>
+              <a:rPr lang="en-GB">
+                <a:hlinkClick r:id="rId4"/>
+              </a:rPr>
+              <a:t>blog.nobel-joergensen.com/2011/02/26/a-path-finding-algorithm-in-unity</a:t>
+            </a:r>
+            <a:r>
+              <a:rPr lang="en-GB" smtClean="0">
+                <a:hlinkClick r:id="rId4"/>
+              </a:rPr>
+              <a:t>/</a:t>
+            </a:r>
+            <a:endParaRPr lang="en-GB" dirty="0" smtClean="0"/>
+          </a:p>
+          <a:p>
             <a:r>
               <a:rPr lang="en-GB" dirty="0" smtClean="0"/>
               <a:t>Minimax</a:t>
@@ -14018,13 +14040,13 @@
             <a:pPr lvl="1"/>
             <a:r>
               <a:rPr lang="en-GB" dirty="0">
-                <a:hlinkClick r:id="rId4"/>
+                <a:hlinkClick r:id="rId5"/>
               </a:rPr>
               <a:t>https://</a:t>
             </a:r>
             <a:r>
               <a:rPr lang="en-GB" dirty="0" smtClean="0">
-                <a:hlinkClick r:id="rId4"/>
+                <a:hlinkClick r:id="rId5"/>
               </a:rPr>
               <a:t>www.javatpoint.com/mini-max-algorithm-in-ai</a:t>
             </a:r>
@@ -14040,13 +14062,13 @@
             <a:pPr lvl="1"/>
             <a:r>
               <a:rPr lang="en-GB" dirty="0">
-                <a:hlinkClick r:id="rId5"/>
+                <a:hlinkClick r:id="rId6"/>
               </a:rPr>
               <a:t>https://gamedevelopment.tutsplus.com/tutorials/3-simple-rules-of-flocking-behaviors-alignment-cohesion-and-separation--</a:t>
             </a:r>
             <a:r>
               <a:rPr lang="en-GB" dirty="0" smtClean="0">
-                <a:hlinkClick r:id="rId5"/>
+                <a:hlinkClick r:id="rId6"/>
               </a:rPr>
               <a:t>gamedev-3444</a:t>
             </a:r>
@@ -14056,13 +14078,13 @@
             <a:pPr lvl="1"/>
             <a:r>
               <a:rPr lang="en-GB" dirty="0">
-                <a:hlinkClick r:id="rId6"/>
+                <a:hlinkClick r:id="rId7"/>
               </a:rPr>
               <a:t>https://</a:t>
             </a:r>
             <a:r>
               <a:rPr lang="en-GB" dirty="0" smtClean="0">
-                <a:hlinkClick r:id="rId6"/>
+                <a:hlinkClick r:id="rId7"/>
               </a:rPr>
               <a:t>wiki.unity3d.com/index.php/Flocking</a:t>
             </a:r>
@@ -14078,25 +14100,9 @@
             <a:pPr lvl="1"/>
             <a:r>
               <a:rPr lang="en-GB" dirty="0">
-                <a:hlinkClick r:id="rId7"/>
+                <a:hlinkClick r:id="rId8"/>
               </a:rPr>
               <a:t>https://www.analyticsvidhya.com/blog/2019/12/game-theory-101-decision-making-normal-form-games</a:t>
-            </a:r>
-            <a:r>
-              <a:rPr lang="en-GB" dirty="0" smtClean="0">
-                <a:hlinkClick r:id="rId7"/>
-              </a:rPr>
-              <a:t>/</a:t>
-            </a:r>
-            <a:endParaRPr lang="en-GB" dirty="0" smtClean="0"/>
-          </a:p>
-          <a:p>
-            <a:pPr lvl="1"/>
-            <a:r>
-              <a:rPr lang="en-GB" dirty="0">
-                <a:hlinkClick r:id="rId8"/>
-              </a:rPr>
-              <a:t>https://alastaira.wordpress.com/2013/01/25/at-a-glance-functions-for-modelling-utility-based-game-ai</a:t>
             </a:r>
             <a:r>
               <a:rPr lang="en-GB" dirty="0" smtClean="0">
@@ -14109,8 +14115,24 @@
           <a:p>
             <a:pPr lvl="1"/>
             <a:r>
-              <a:rPr lang="en-GB">
+              <a:rPr lang="en-GB" dirty="0">
                 <a:hlinkClick r:id="rId9"/>
+              </a:rPr>
+              <a:t>https://alastaira.wordpress.com/2013/01/25/at-a-glance-functions-for-modelling-utility-based-game-ai</a:t>
+            </a:r>
+            <a:r>
+              <a:rPr lang="en-GB" dirty="0" smtClean="0">
+                <a:hlinkClick r:id="rId9"/>
+              </a:rPr>
+              <a:t>/</a:t>
+            </a:r>
+            <a:endParaRPr lang="en-GB" dirty="0" smtClean="0"/>
+          </a:p>
+          <a:p>
+            <a:pPr lvl="1"/>
+            <a:r>
+              <a:rPr lang="en-GB" dirty="0">
+                <a:hlinkClick r:id="rId10"/>
               </a:rPr>
               <a:t>https://mcguirev10.com/2019/01/03/ai-decision-making-with-utility-scores-part-1.html</a:t>
             </a:r>
@@ -14126,13 +14148,13 @@
             <a:pPr lvl="1"/>
             <a:r>
               <a:rPr lang="en-GB" dirty="0">
-                <a:hlinkClick r:id="rId10"/>
+                <a:hlinkClick r:id="rId11"/>
               </a:rPr>
               <a:t>https://guttulus.com/what-is-local-search-algorithm-in-artificial-intelligence</a:t>
             </a:r>
             <a:r>
               <a:rPr lang="en-GB" dirty="0" smtClean="0">
-                <a:hlinkClick r:id="rId10"/>
+                <a:hlinkClick r:id="rId11"/>
               </a:rPr>
               <a:t>/</a:t>
             </a:r>
@@ -14148,13 +14170,13 @@
             <a:pPr lvl="1"/>
             <a:r>
               <a:rPr lang="en-GB" dirty="0">
-                <a:hlinkClick r:id="rId11"/>
+                <a:hlinkClick r:id="rId12"/>
               </a:rPr>
               <a:t>https://</a:t>
             </a:r>
             <a:r>
               <a:rPr lang="en-GB" dirty="0" smtClean="0">
-                <a:hlinkClick r:id="rId11"/>
+                <a:hlinkClick r:id="rId12"/>
               </a:rPr>
               <a:t>en.wikipedia.org/wiki/Monte_Carlo_tree_search</a:t>
             </a:r>
@@ -14164,13 +14186,13 @@
             <a:pPr lvl="1"/>
             <a:r>
               <a:rPr lang="en-GB" dirty="0">
-                <a:hlinkClick r:id="rId12"/>
+                <a:hlinkClick r:id="rId13"/>
               </a:rPr>
               <a:t>https://www.analyticsvidhya.com/blog/2019/01/monte-carlo-tree-search-introduction-algorithm-deepmind-alphago</a:t>
             </a:r>
             <a:r>
               <a:rPr lang="en-GB" dirty="0" smtClean="0">
-                <a:hlinkClick r:id="rId12"/>
+                <a:hlinkClick r:id="rId13"/>
               </a:rPr>
               <a:t>/</a:t>
             </a:r>

</xml_diff>

<commit_message>
Fantasy bee asset added. Made some progress on the 3D flocking algorithm but still needs work.
</commit_message>
<xml_diff>
--- a/research stuff.pptx
+++ b/research stuff.pptx
@@ -14011,19 +14011,13 @@
           <a:p>
             <a:pPr lvl="1"/>
             <a:r>
-              <a:rPr lang="en-GB">
+              <a:rPr lang="en-GB" dirty="0">
                 <a:hlinkClick r:id="rId4"/>
               </a:rPr>
-              <a:t>https://</a:t>
+              <a:t>https://blog.nobel-joergensen.com/2011/02/26/a-path-finding-algorithm-in-unity</a:t>
             </a:r>
             <a:r>
-              <a:rPr lang="en-GB">
-                <a:hlinkClick r:id="rId4"/>
-              </a:rPr>
-              <a:t>blog.nobel-joergensen.com/2011/02/26/a-path-finding-algorithm-in-unity</a:t>
-            </a:r>
-            <a:r>
-              <a:rPr lang="en-GB" smtClean="0">
+              <a:rPr lang="en-GB" dirty="0" smtClean="0">
                 <a:hlinkClick r:id="rId4"/>
               </a:rPr>
               <a:t>/</a:t>

</xml_diff>

<commit_message>
added a research reference for shooting calculations
</commit_message>
<xml_diff>
--- a/research stuff.pptx
+++ b/research stuff.pptx
@@ -2884,7 +2884,7 @@
             <a:fld id="{0A98AF03-7270-45C2-A683-C5E353EF01A5}" type="datetime4">
               <a:rPr lang="en-US" smtClean="0"/>
               <a:pPr/>
-              <a:t>February 10, 2020</a:t>
+              <a:t>February 24, 2020</a:t>
             </a:fld>
             <a:endParaRPr lang="en-US" dirty="0"/>
           </a:p>
@@ -3171,7 +3171,7 @@
             <a:fld id="{A2FB5AFD-D735-4504-A039-ADEBB6448D55}" type="datetime4">
               <a:rPr lang="en-US" smtClean="0"/>
               <a:pPr/>
-              <a:t>February 10, 2020</a:t>
+              <a:t>February 24, 2020</a:t>
             </a:fld>
             <a:endParaRPr lang="en-US"/>
           </a:p>
@@ -3348,7 +3348,7 @@
             <a:fld id="{AB5C8118-FB93-4E87-B380-0175F2FE2167}" type="datetime4">
               <a:rPr lang="en-US" smtClean="0"/>
               <a:pPr/>
-              <a:t>February 10, 2020</a:t>
+              <a:t>February 24, 2020</a:t>
             </a:fld>
             <a:endParaRPr lang="en-US"/>
           </a:p>
@@ -3515,7 +3515,7 @@
             <a:fld id="{05A93482-8E69-40F7-BCAD-5662A6CADB27}" type="datetime4">
               <a:rPr lang="en-US" smtClean="0"/>
               <a:pPr/>
-              <a:t>February 10, 2020</a:t>
+              <a:t>February 24, 2020</a:t>
             </a:fld>
             <a:endParaRPr lang="en-US"/>
           </a:p>
@@ -3758,7 +3758,7 @@
             <a:fld id="{FBB7EAE1-CAAC-4AEF-919E-158692B1E55E}" type="datetime4">
               <a:rPr lang="en-US" smtClean="0"/>
               <a:pPr/>
-              <a:t>February 10, 2020</a:t>
+              <a:t>February 24, 2020</a:t>
             </a:fld>
             <a:endParaRPr lang="en-US"/>
           </a:p>
@@ -3873,7 +3873,7 @@
             <a:fld id="{9525A706-D8F2-4D1A-855A-CADC92600C26}" type="datetime4">
               <a:rPr lang="en-US" smtClean="0"/>
               <a:pPr/>
-              <a:t>February 10, 2020</a:t>
+              <a:t>February 24, 2020</a:t>
             </a:fld>
             <a:endParaRPr lang="en-US"/>
           </a:p>
@@ -4414,7 +4414,7 @@
             <a:fld id="{99B4F123-1704-49AC-9D15-C4B1462B8014}" type="datetime4">
               <a:rPr lang="en-US" smtClean="0"/>
               <a:pPr/>
-              <a:t>February 10, 2020</a:t>
+              <a:t>February 24, 2020</a:t>
             </a:fld>
             <a:endParaRPr lang="en-US"/>
           </a:p>
@@ -4529,7 +4529,7 @@
             <a:fld id="{E3127EC2-47FB-48A1-8644-C8A81DDAA119}" type="datetime4">
               <a:rPr lang="en-US" smtClean="0"/>
               <a:pPr/>
-              <a:t>February 10, 2020</a:t>
+              <a:t>February 24, 2020</a:t>
             </a:fld>
             <a:endParaRPr lang="en-US"/>
           </a:p>
@@ -4621,7 +4621,7 @@
             <a:fld id="{AE3EC3ED-7435-49F9-84C8-03CCA2F8DEDB}" type="datetime4">
               <a:rPr lang="en-US" smtClean="0"/>
               <a:pPr/>
-              <a:t>February 10, 2020</a:t>
+              <a:t>February 24, 2020</a:t>
             </a:fld>
             <a:endParaRPr lang="en-US"/>
           </a:p>
@@ -7274,7 +7274,7 @@
             <a:fld id="{3FC49BF1-FCD3-4395-8FF6-0047AF66228E}" type="datetime4">
               <a:rPr lang="en-US" smtClean="0"/>
               <a:pPr/>
-              <a:t>February 10, 2020</a:t>
+              <a:t>February 24, 2020</a:t>
             </a:fld>
             <a:endParaRPr lang="en-US"/>
           </a:p>
@@ -10488,7 +10488,7 @@
             <a:fld id="{CA861222-2C8B-4501-BE87-6797EC025925}" type="datetime4">
               <a:rPr lang="en-US" smtClean="0"/>
               <a:pPr/>
-              <a:t>February 10, 2020</a:t>
+              <a:t>February 24, 2020</a:t>
             </a:fld>
             <a:endParaRPr lang="en-US"/>
           </a:p>
@@ -13312,7 +13312,7 @@
             <a:fld id="{16C01193-8287-4834-A286-6B880643E934}" type="datetime4">
               <a:rPr lang="en-US" smtClean="0"/>
               <a:pPr/>
-              <a:t>February 10, 2020</a:t>
+              <a:t>February 24, 2020</a:t>
             </a:fld>
             <a:endParaRPr lang="en-US"/>
           </a:p>
@@ -13963,255 +13963,274 @@
         <p:spPr/>
         <p:txBody>
           <a:bodyPr>
-            <a:normAutofit fontScale="40000" lnSpcReduction="20000"/>
+            <a:normAutofit fontScale="32500" lnSpcReduction="20000"/>
           </a:bodyPr>
           <a:lstStyle/>
           <a:p>
             <a:r>
-              <a:rPr lang="en-US" dirty="0" smtClean="0"/>
+              <a:rPr lang="en-US" sz="2800" dirty="0" smtClean="0"/>
               <a:t>Pathfinding A*</a:t>
             </a:r>
           </a:p>
           <a:p>
             <a:pPr lvl="1"/>
             <a:r>
-              <a:rPr lang="en-GB" dirty="0">
+              <a:rPr lang="en-GB" sz="2400" dirty="0">
                 <a:hlinkClick r:id="rId2"/>
               </a:rPr>
               <a:t>http://csis.pace.edu/~</a:t>
             </a:r>
             <a:r>
-              <a:rPr lang="en-GB" dirty="0" smtClean="0">
+              <a:rPr lang="en-GB" sz="2400" dirty="0" smtClean="0">
                 <a:hlinkClick r:id="rId2"/>
               </a:rPr>
               <a:t>benjamin/teaching/cs627/webfiles/Astar.pdf</a:t>
             </a:r>
-            <a:endParaRPr lang="en-GB" dirty="0" smtClean="0"/>
+            <a:endParaRPr lang="en-GB" sz="2400" dirty="0" smtClean="0"/>
           </a:p>
           <a:p>
             <a:pPr lvl="1"/>
             <a:r>
-              <a:rPr lang="en-GB" dirty="0" smtClean="0"/>
+              <a:rPr lang="en-GB" sz="2400" dirty="0" smtClean="0"/>
               <a:t>Hex variety - </a:t>
             </a:r>
             <a:r>
-              <a:rPr lang="en-GB" dirty="0">
+              <a:rPr lang="en-GB" sz="2400" dirty="0">
                 <a:hlinkClick r:id="rId3"/>
               </a:rPr>
               <a:t>https://</a:t>
             </a:r>
             <a:r>
-              <a:rPr lang="en-GB" dirty="0" smtClean="0">
+              <a:rPr lang="en-GB" sz="2400" dirty="0" smtClean="0">
                 <a:hlinkClick r:id="rId3"/>
               </a:rPr>
               <a:t>stackoverflow.com/questions/38015645/a-pathfinding-in-a-hexagonal-grid</a:t>
             </a:r>
-            <a:endParaRPr lang="en-GB" dirty="0" smtClean="0"/>
+            <a:endParaRPr lang="en-GB" sz="2400" dirty="0" smtClean="0"/>
           </a:p>
           <a:p>
             <a:pPr lvl="1"/>
             <a:r>
-              <a:rPr lang="en-GB" dirty="0">
+              <a:rPr lang="en-GB" sz="2400" dirty="0">
                 <a:hlinkClick r:id="rId4"/>
               </a:rPr>
               <a:t>https://blog.nobel-joergensen.com/2011/02/26/a-path-finding-algorithm-in-unity</a:t>
             </a:r>
             <a:r>
-              <a:rPr lang="en-GB" dirty="0" smtClean="0">
+              <a:rPr lang="en-GB" sz="2400" dirty="0" smtClean="0">
                 <a:hlinkClick r:id="rId4"/>
               </a:rPr>
               <a:t>/</a:t>
             </a:r>
-            <a:endParaRPr lang="en-GB" dirty="0" smtClean="0"/>
+            <a:endParaRPr lang="en-GB" sz="2400" dirty="0" smtClean="0"/>
           </a:p>
           <a:p>
             <a:r>
-              <a:rPr lang="en-GB" dirty="0" smtClean="0"/>
+              <a:rPr lang="en-GB" sz="2800" dirty="0" smtClean="0"/>
               <a:t>Minimax</a:t>
             </a:r>
           </a:p>
           <a:p>
             <a:pPr lvl="1"/>
             <a:r>
-              <a:rPr lang="en-GB" dirty="0">
+              <a:rPr lang="en-GB" sz="2400" dirty="0">
                 <a:hlinkClick r:id="rId5"/>
               </a:rPr>
               <a:t>https://</a:t>
             </a:r>
             <a:r>
-              <a:rPr lang="en-GB" dirty="0" smtClean="0">
+              <a:rPr lang="en-GB" sz="2400" dirty="0" smtClean="0">
                 <a:hlinkClick r:id="rId5"/>
               </a:rPr>
               <a:t>www.javatpoint.com/mini-max-algorithm-in-ai</a:t>
             </a:r>
-            <a:endParaRPr lang="en-GB" dirty="0" smtClean="0"/>
+            <a:endParaRPr lang="en-GB" sz="2400" dirty="0" smtClean="0"/>
           </a:p>
           <a:p>
             <a:r>
-              <a:rPr lang="en-GB" dirty="0" smtClean="0"/>
+              <a:rPr lang="en-GB" sz="2800" dirty="0" smtClean="0"/>
               <a:t>Flocking Algorithms</a:t>
             </a:r>
           </a:p>
           <a:p>
             <a:pPr lvl="1"/>
             <a:r>
-              <a:rPr lang="en-GB" dirty="0">
+              <a:rPr lang="en-GB" sz="2400" dirty="0">
                 <a:hlinkClick r:id="rId6"/>
               </a:rPr>
               <a:t>https://gamedevelopment.tutsplus.com/tutorials/3-simple-rules-of-flocking-behaviors-alignment-cohesion-and-separation--</a:t>
             </a:r>
             <a:r>
-              <a:rPr lang="en-GB" dirty="0" smtClean="0">
+              <a:rPr lang="en-GB" sz="2400" dirty="0" smtClean="0">
                 <a:hlinkClick r:id="rId6"/>
               </a:rPr>
               <a:t>gamedev-3444</a:t>
             </a:r>
-            <a:endParaRPr lang="en-GB" dirty="0" smtClean="0"/>
+            <a:endParaRPr lang="en-GB" sz="2400" dirty="0" smtClean="0"/>
           </a:p>
           <a:p>
             <a:pPr lvl="1"/>
             <a:r>
-              <a:rPr lang="en-GB" dirty="0">
+              <a:rPr lang="en-GB" sz="2400" dirty="0">
                 <a:hlinkClick r:id="rId7"/>
               </a:rPr>
               <a:t>https://</a:t>
             </a:r>
             <a:r>
-              <a:rPr lang="en-GB" dirty="0" smtClean="0">
+              <a:rPr lang="en-GB" sz="2400" dirty="0" smtClean="0">
                 <a:hlinkClick r:id="rId7"/>
               </a:rPr>
               <a:t>wiki.unity3d.com/index.php/Flocking</a:t>
             </a:r>
-            <a:endParaRPr lang="en-GB" dirty="0" smtClean="0"/>
+            <a:endParaRPr lang="en-GB" sz="2400" dirty="0" smtClean="0"/>
           </a:p>
           <a:p>
             <a:r>
-              <a:rPr lang="en-GB" dirty="0" smtClean="0"/>
+              <a:rPr lang="en-GB" sz="2800" dirty="0" smtClean="0"/>
               <a:t>Decision making </a:t>
             </a:r>
           </a:p>
           <a:p>
             <a:pPr lvl="1"/>
             <a:r>
-              <a:rPr lang="en-GB" dirty="0">
+              <a:rPr lang="en-GB" sz="2400" dirty="0">
                 <a:hlinkClick r:id="rId8"/>
               </a:rPr>
               <a:t>https://www.analyticsvidhya.com/blog/2019/12/game-theory-101-decision-making-normal-form-games</a:t>
             </a:r>
             <a:r>
-              <a:rPr lang="en-GB" dirty="0" smtClean="0">
+              <a:rPr lang="en-GB" sz="2400" dirty="0" smtClean="0">
                 <a:hlinkClick r:id="rId8"/>
               </a:rPr>
               <a:t>/</a:t>
             </a:r>
-            <a:endParaRPr lang="en-GB" dirty="0" smtClean="0"/>
+            <a:endParaRPr lang="en-GB" sz="2400" dirty="0" smtClean="0"/>
           </a:p>
           <a:p>
             <a:pPr lvl="1"/>
             <a:r>
-              <a:rPr lang="en-GB" dirty="0">
+              <a:rPr lang="en-GB" sz="2400" dirty="0">
                 <a:hlinkClick r:id="rId9"/>
               </a:rPr>
               <a:t>https://alastaira.wordpress.com/2013/01/25/at-a-glance-functions-for-modelling-utility-based-game-ai</a:t>
             </a:r>
             <a:r>
-              <a:rPr lang="en-GB" dirty="0" smtClean="0">
+              <a:rPr lang="en-GB" sz="2400" dirty="0" smtClean="0">
                 <a:hlinkClick r:id="rId9"/>
               </a:rPr>
               <a:t>/</a:t>
             </a:r>
-            <a:endParaRPr lang="en-GB" dirty="0" smtClean="0"/>
+            <a:endParaRPr lang="en-GB" sz="2400" dirty="0" smtClean="0"/>
           </a:p>
           <a:p>
             <a:pPr lvl="1"/>
             <a:r>
-              <a:rPr lang="en-GB" dirty="0">
+              <a:rPr lang="en-GB" sz="2400" dirty="0">
                 <a:hlinkClick r:id="rId10"/>
               </a:rPr>
               <a:t>https://mcguirev10.com/2019/01/03/ai-decision-making-with-utility-scores-part-1.html</a:t>
             </a:r>
-            <a:endParaRPr lang="en-GB" dirty="0"/>
+            <a:endParaRPr lang="en-GB" sz="2400" dirty="0"/>
           </a:p>
           <a:p>
             <a:r>
-              <a:rPr lang="en-GB" dirty="0" smtClean="0"/>
+              <a:rPr lang="en-GB" sz="2800" dirty="0" smtClean="0"/>
               <a:t>Local Search</a:t>
             </a:r>
           </a:p>
           <a:p>
             <a:pPr lvl="1"/>
             <a:r>
-              <a:rPr lang="en-GB" dirty="0">
+              <a:rPr lang="en-GB" sz="2400" dirty="0">
                 <a:hlinkClick r:id="rId11"/>
               </a:rPr>
               <a:t>https://guttulus.com/what-is-local-search-algorithm-in-artificial-intelligence</a:t>
             </a:r>
             <a:r>
-              <a:rPr lang="en-GB" dirty="0" smtClean="0">
+              <a:rPr lang="en-GB" sz="2400" dirty="0" smtClean="0">
                 <a:hlinkClick r:id="rId11"/>
               </a:rPr>
               <a:t>/</a:t>
             </a:r>
-            <a:endParaRPr lang="en-GB" dirty="0" smtClean="0"/>
+            <a:endParaRPr lang="en-GB" sz="2400" dirty="0" smtClean="0"/>
           </a:p>
           <a:p>
             <a:r>
-              <a:rPr lang="en-GB" dirty="0" smtClean="0"/>
+              <a:rPr lang="en-GB" sz="2800" dirty="0" smtClean="0"/>
               <a:t>Monte Carlo</a:t>
             </a:r>
           </a:p>
           <a:p>
             <a:pPr lvl="1"/>
             <a:r>
-              <a:rPr lang="en-GB" dirty="0">
+              <a:rPr lang="en-GB" sz="2400" dirty="0">
                 <a:hlinkClick r:id="rId12"/>
               </a:rPr>
               <a:t>https://</a:t>
             </a:r>
             <a:r>
-              <a:rPr lang="en-GB" dirty="0" smtClean="0">
+              <a:rPr lang="en-GB" sz="2400" dirty="0" smtClean="0">
                 <a:hlinkClick r:id="rId12"/>
               </a:rPr>
               <a:t>en.wikipedia.org/wiki/Monte_Carlo_tree_search</a:t>
             </a:r>
-            <a:endParaRPr lang="en-GB" dirty="0" smtClean="0"/>
+            <a:endParaRPr lang="en-GB" sz="2400" dirty="0" smtClean="0"/>
           </a:p>
           <a:p>
             <a:pPr lvl="1"/>
             <a:r>
-              <a:rPr lang="en-GB" dirty="0">
+              <a:rPr lang="en-GB" sz="2400" dirty="0">
                 <a:hlinkClick r:id="rId13"/>
               </a:rPr>
               <a:t>https://www.analyticsvidhya.com/blog/2019/01/monte-carlo-tree-search-introduction-algorithm-deepmind-alphago</a:t>
             </a:r>
             <a:r>
-              <a:rPr lang="en-GB" dirty="0" smtClean="0">
+              <a:rPr lang="en-GB" sz="2400" dirty="0" smtClean="0">
                 <a:hlinkClick r:id="rId13"/>
               </a:rPr>
               <a:t>/</a:t>
             </a:r>
-            <a:endParaRPr lang="en-GB" dirty="0" smtClean="0"/>
+            <a:endParaRPr lang="en-GB" sz="2400" dirty="0" smtClean="0"/>
           </a:p>
           <a:p>
             <a:r>
-              <a:rPr lang="en-GB" dirty="0" smtClean="0"/>
+              <a:rPr lang="en-GB" sz="2800" dirty="0" smtClean="0"/>
               <a:t>Learning – for later.</a:t>
             </a:r>
           </a:p>
           <a:p>
             <a:pPr lvl="1"/>
             <a:r>
-              <a:rPr lang="en-GB" dirty="0" smtClean="0"/>
+              <a:rPr lang="en-GB" sz="2400" dirty="0" smtClean="0"/>
               <a:t>Evolutionary</a:t>
             </a:r>
           </a:p>
           <a:p>
             <a:pPr lvl="1"/>
             <a:r>
-              <a:rPr lang="en-GB" dirty="0" smtClean="0"/>
+              <a:rPr lang="en-GB" sz="2400" dirty="0" smtClean="0"/>
               <a:t>Other</a:t>
             </a:r>
-            <a:endParaRPr lang="en-GB" dirty="0"/>
+          </a:p>
+          <a:p>
+            <a:r>
+              <a:rPr lang="en-GB" sz="2800" dirty="0" smtClean="0"/>
+              <a:t>Gameplay</a:t>
+            </a:r>
+          </a:p>
+          <a:p>
+            <a:pPr lvl="1"/>
+            <a:r>
+              <a:rPr lang="en-GB" sz="2400" dirty="0" smtClean="0"/>
+              <a:t>Shooting calculations - </a:t>
+            </a:r>
+            <a:r>
+              <a:rPr lang="en-GB" sz="2400" dirty="0">
+                <a:hlinkClick r:id="rId14"/>
+              </a:rPr>
+              <a:t>https://www.ufopaedia.org/index.php/Chance_to_Hit_(EU2012)</a:t>
+            </a:r>
+            <a:endParaRPr lang="en-GB" sz="2400" dirty="0"/>
           </a:p>
           <a:p>
             <a:endParaRPr lang="en-US" dirty="0"/>

</xml_diff>